<commit_message>
add zombies to town
</commit_message>
<xml_diff>
--- a/diagrams.pptx
+++ b/diagrams.pptx
@@ -293,7 +293,7 @@
           <a:p>
             <a:fld id="{A158B014-3023-2543-8984-7EAE69C1CC0E}" type="datetimeFigureOut">
               <a:rPr lang="en-US" smtClean="0"/>
-              <a:t>7/28/16</a:t>
+              <a:t>7/31/16</a:t>
             </a:fld>
             <a:endParaRPr lang="en-US"/>
           </a:p>
@@ -463,7 +463,7 @@
           <a:p>
             <a:fld id="{A158B014-3023-2543-8984-7EAE69C1CC0E}" type="datetimeFigureOut">
               <a:rPr lang="en-US" smtClean="0"/>
-              <a:t>7/28/16</a:t>
+              <a:t>7/31/16</a:t>
             </a:fld>
             <a:endParaRPr lang="en-US"/>
           </a:p>
@@ -643,7 +643,7 @@
           <a:p>
             <a:fld id="{A158B014-3023-2543-8984-7EAE69C1CC0E}" type="datetimeFigureOut">
               <a:rPr lang="en-US" smtClean="0"/>
-              <a:t>7/28/16</a:t>
+              <a:t>7/31/16</a:t>
             </a:fld>
             <a:endParaRPr lang="en-US"/>
           </a:p>
@@ -813,7 +813,7 @@
           <a:p>
             <a:fld id="{A158B014-3023-2543-8984-7EAE69C1CC0E}" type="datetimeFigureOut">
               <a:rPr lang="en-US" smtClean="0"/>
-              <a:t>7/28/16</a:t>
+              <a:t>7/31/16</a:t>
             </a:fld>
             <a:endParaRPr lang="en-US"/>
           </a:p>
@@ -1059,7 +1059,7 @@
           <a:p>
             <a:fld id="{A158B014-3023-2543-8984-7EAE69C1CC0E}" type="datetimeFigureOut">
               <a:rPr lang="en-US" smtClean="0"/>
-              <a:t>7/28/16</a:t>
+              <a:t>7/31/16</a:t>
             </a:fld>
             <a:endParaRPr lang="en-US"/>
           </a:p>
@@ -1347,7 +1347,7 @@
           <a:p>
             <a:fld id="{A158B014-3023-2543-8984-7EAE69C1CC0E}" type="datetimeFigureOut">
               <a:rPr lang="en-US" smtClean="0"/>
-              <a:t>7/28/16</a:t>
+              <a:t>7/31/16</a:t>
             </a:fld>
             <a:endParaRPr lang="en-US"/>
           </a:p>
@@ -1769,7 +1769,7 @@
           <a:p>
             <a:fld id="{A158B014-3023-2543-8984-7EAE69C1CC0E}" type="datetimeFigureOut">
               <a:rPr lang="en-US" smtClean="0"/>
-              <a:t>7/28/16</a:t>
+              <a:t>7/31/16</a:t>
             </a:fld>
             <a:endParaRPr lang="en-US"/>
           </a:p>
@@ -1887,7 +1887,7 @@
           <a:p>
             <a:fld id="{A158B014-3023-2543-8984-7EAE69C1CC0E}" type="datetimeFigureOut">
               <a:rPr lang="en-US" smtClean="0"/>
-              <a:t>7/28/16</a:t>
+              <a:t>7/31/16</a:t>
             </a:fld>
             <a:endParaRPr lang="en-US"/>
           </a:p>
@@ -1982,7 +1982,7 @@
           <a:p>
             <a:fld id="{A158B014-3023-2543-8984-7EAE69C1CC0E}" type="datetimeFigureOut">
               <a:rPr lang="en-US" smtClean="0"/>
-              <a:t>7/28/16</a:t>
+              <a:t>7/31/16</a:t>
             </a:fld>
             <a:endParaRPr lang="en-US"/>
           </a:p>
@@ -2259,7 +2259,7 @@
           <a:p>
             <a:fld id="{A158B014-3023-2543-8984-7EAE69C1CC0E}" type="datetimeFigureOut">
               <a:rPr lang="en-US" smtClean="0"/>
-              <a:t>7/28/16</a:t>
+              <a:t>7/31/16</a:t>
             </a:fld>
             <a:endParaRPr lang="en-US"/>
           </a:p>
@@ -2512,7 +2512,7 @@
           <a:p>
             <a:fld id="{A158B014-3023-2543-8984-7EAE69C1CC0E}" type="datetimeFigureOut">
               <a:rPr lang="en-US" smtClean="0"/>
-              <a:t>7/28/16</a:t>
+              <a:t>7/31/16</a:t>
             </a:fld>
             <a:endParaRPr lang="en-US"/>
           </a:p>
@@ -2725,7 +2725,7 @@
           <a:p>
             <a:fld id="{A158B014-3023-2543-8984-7EAE69C1CC0E}" type="datetimeFigureOut">
               <a:rPr lang="en-US" smtClean="0"/>
-              <a:t>7/28/16</a:t>
+              <a:t>7/31/16</a:t>
             </a:fld>
             <a:endParaRPr lang="en-US"/>
           </a:p>
@@ -4242,7 +4242,15 @@
             <a:pPr algn="ctr"/>
             <a:r>
               <a:rPr lang="en-US" dirty="0" smtClean="0"/>
-              <a:t>4: Infirmary: Pink</a:t>
+              <a:t>4: </a:t>
+            </a:r>
+            <a:r>
+              <a:rPr lang="en-US" dirty="0" smtClean="0"/>
+              <a:t>Infirmary</a:t>
+            </a:r>
+            <a:r>
+              <a:rPr lang="en-US" dirty="0" smtClean="0"/>
+              <a:t>: Pink</a:t>
             </a:r>
             <a:endParaRPr lang="en-US" dirty="0"/>
           </a:p>
@@ -5390,7 +5398,7 @@
         </p:nvSpPr>
         <p:spPr>
           <a:xfrm>
-            <a:off x="5475317" y="4378171"/>
+            <a:off x="3741664" y="5220385"/>
             <a:ext cx="828194" cy="490915"/>
           </a:xfrm>
           <a:prstGeom prst="rect">
@@ -5434,7 +5442,7 @@
         </p:nvSpPr>
         <p:spPr>
           <a:xfrm>
-            <a:off x="5589665" y="4414071"/>
+            <a:off x="3856012" y="5256285"/>
             <a:ext cx="713845" cy="369332"/>
           </a:xfrm>
           <a:prstGeom prst="rect">
@@ -6440,28 +6448,28 @@
         <p:spPr>
           <a:xfrm>
             <a:off x="2515491" y="4779954"/>
-            <a:ext cx="856325" cy="400110"/>
-          </a:xfrm>
-          <a:prstGeom prst="rect">
-            <a:avLst/>
-          </a:prstGeom>
-          <a:noFill/>
-        </p:spPr>
-        <p:txBody>
-          <a:bodyPr wrap="none" rtlCol="0">
-            <a:spAutoFit/>
-          </a:bodyPr>
-          <a:lstStyle/>
-          <a:p>
-            <a:r>
-              <a:rPr lang="en-US" sz="1000" dirty="0"/>
-              <a:t>Brotherhood</a:t>
-            </a:r>
-          </a:p>
-          <a:p>
-            <a:r>
-              <a:rPr lang="en-US" sz="1000" dirty="0"/>
-              <a:t>OTSA</a:t>
+            <a:ext cx="851665" cy="400110"/>
+          </a:xfrm>
+          <a:prstGeom prst="rect">
+            <a:avLst/>
+          </a:prstGeom>
+          <a:noFill/>
+        </p:spPr>
+        <p:txBody>
+          <a:bodyPr wrap="none" rtlCol="0">
+            <a:spAutoFit/>
+          </a:bodyPr>
+          <a:lstStyle/>
+          <a:p>
+            <a:r>
+              <a:rPr lang="en-US" sz="1000" dirty="0" smtClean="0"/>
+              <a:t>Biological</a:t>
+            </a:r>
+          </a:p>
+          <a:p>
+            <a:r>
+              <a:rPr lang="en-US" sz="1000" dirty="0" smtClean="0"/>
+              <a:t>containment</a:t>
             </a:r>
           </a:p>
         </p:txBody>

</xml_diff>

<commit_message>
replaced pogoland walmart with hospital
</commit_message>
<xml_diff>
--- a/diagrams.pptx
+++ b/diagrams.pptx
@@ -293,7 +293,7 @@
           <a:p>
             <a:fld id="{A158B014-3023-2543-8984-7EAE69C1CC0E}" type="datetimeFigureOut">
               <a:rPr lang="en-US" smtClean="0"/>
-              <a:t>7/31/16</a:t>
+              <a:t>8/13/16</a:t>
             </a:fld>
             <a:endParaRPr lang="en-US"/>
           </a:p>
@@ -463,7 +463,7 @@
           <a:p>
             <a:fld id="{A158B014-3023-2543-8984-7EAE69C1CC0E}" type="datetimeFigureOut">
               <a:rPr lang="en-US" smtClean="0"/>
-              <a:t>7/31/16</a:t>
+              <a:t>8/13/16</a:t>
             </a:fld>
             <a:endParaRPr lang="en-US"/>
           </a:p>
@@ -643,7 +643,7 @@
           <a:p>
             <a:fld id="{A158B014-3023-2543-8984-7EAE69C1CC0E}" type="datetimeFigureOut">
               <a:rPr lang="en-US" smtClean="0"/>
-              <a:t>7/31/16</a:t>
+              <a:t>8/13/16</a:t>
             </a:fld>
             <a:endParaRPr lang="en-US"/>
           </a:p>
@@ -813,7 +813,7 @@
           <a:p>
             <a:fld id="{A158B014-3023-2543-8984-7EAE69C1CC0E}" type="datetimeFigureOut">
               <a:rPr lang="en-US" smtClean="0"/>
-              <a:t>7/31/16</a:t>
+              <a:t>8/13/16</a:t>
             </a:fld>
             <a:endParaRPr lang="en-US"/>
           </a:p>
@@ -1059,7 +1059,7 @@
           <a:p>
             <a:fld id="{A158B014-3023-2543-8984-7EAE69C1CC0E}" type="datetimeFigureOut">
               <a:rPr lang="en-US" smtClean="0"/>
-              <a:t>7/31/16</a:t>
+              <a:t>8/13/16</a:t>
             </a:fld>
             <a:endParaRPr lang="en-US"/>
           </a:p>
@@ -1347,7 +1347,7 @@
           <a:p>
             <a:fld id="{A158B014-3023-2543-8984-7EAE69C1CC0E}" type="datetimeFigureOut">
               <a:rPr lang="en-US" smtClean="0"/>
-              <a:t>7/31/16</a:t>
+              <a:t>8/13/16</a:t>
             </a:fld>
             <a:endParaRPr lang="en-US"/>
           </a:p>
@@ -1769,7 +1769,7 @@
           <a:p>
             <a:fld id="{A158B014-3023-2543-8984-7EAE69C1CC0E}" type="datetimeFigureOut">
               <a:rPr lang="en-US" smtClean="0"/>
-              <a:t>7/31/16</a:t>
+              <a:t>8/13/16</a:t>
             </a:fld>
             <a:endParaRPr lang="en-US"/>
           </a:p>
@@ -1887,7 +1887,7 @@
           <a:p>
             <a:fld id="{A158B014-3023-2543-8984-7EAE69C1CC0E}" type="datetimeFigureOut">
               <a:rPr lang="en-US" smtClean="0"/>
-              <a:t>7/31/16</a:t>
+              <a:t>8/13/16</a:t>
             </a:fld>
             <a:endParaRPr lang="en-US"/>
           </a:p>
@@ -1982,7 +1982,7 @@
           <a:p>
             <a:fld id="{A158B014-3023-2543-8984-7EAE69C1CC0E}" type="datetimeFigureOut">
               <a:rPr lang="en-US" smtClean="0"/>
-              <a:t>7/31/16</a:t>
+              <a:t>8/13/16</a:t>
             </a:fld>
             <a:endParaRPr lang="en-US"/>
           </a:p>
@@ -2259,7 +2259,7 @@
           <a:p>
             <a:fld id="{A158B014-3023-2543-8984-7EAE69C1CC0E}" type="datetimeFigureOut">
               <a:rPr lang="en-US" smtClean="0"/>
-              <a:t>7/31/16</a:t>
+              <a:t>8/13/16</a:t>
             </a:fld>
             <a:endParaRPr lang="en-US"/>
           </a:p>
@@ -2512,7 +2512,7 @@
           <a:p>
             <a:fld id="{A158B014-3023-2543-8984-7EAE69C1CC0E}" type="datetimeFigureOut">
               <a:rPr lang="en-US" smtClean="0"/>
-              <a:t>7/31/16</a:t>
+              <a:t>8/13/16</a:t>
             </a:fld>
             <a:endParaRPr lang="en-US"/>
           </a:p>
@@ -2725,7 +2725,7 @@
           <a:p>
             <a:fld id="{A158B014-3023-2543-8984-7EAE69C1CC0E}" type="datetimeFigureOut">
               <a:rPr lang="en-US" smtClean="0"/>
-              <a:t>7/31/16</a:t>
+              <a:t>8/13/16</a:t>
             </a:fld>
             <a:endParaRPr lang="en-US"/>
           </a:p>
@@ -3108,7 +3108,7 @@
         </p:nvSpPr>
         <p:spPr>
           <a:xfrm>
-            <a:off x="3780117" y="4407647"/>
+            <a:off x="3763682" y="5190546"/>
             <a:ext cx="1090706" cy="974166"/>
           </a:xfrm>
           <a:prstGeom prst="ellipse">
@@ -3370,7 +3370,7 @@
         </p:nvSpPr>
         <p:spPr>
           <a:xfrm>
-            <a:off x="3914586" y="5871883"/>
+            <a:off x="3914586" y="6199077"/>
             <a:ext cx="901283" cy="369332"/>
           </a:xfrm>
           <a:prstGeom prst="rect">
@@ -3400,7 +3400,7 @@
         </p:nvSpPr>
         <p:spPr>
           <a:xfrm>
-            <a:off x="3799869" y="4649695"/>
+            <a:off x="3799869" y="5347448"/>
             <a:ext cx="1090976" cy="646331"/>
           </a:xfrm>
           <a:prstGeom prst="rect">
@@ -3524,6 +3524,80 @@
             <a:r>
               <a:rPr lang="en-US" dirty="0" smtClean="0"/>
               <a:t>Stairs</a:t>
+            </a:r>
+            <a:endParaRPr lang="en-US" dirty="0"/>
+          </a:p>
+        </p:txBody>
+      </p:sp>
+      <p:sp>
+        <p:nvSpPr>
+          <p:cNvPr id="16" name="Rectangle 15"/>
+          <p:cNvSpPr/>
+          <p:nvPr/>
+        </p:nvSpPr>
+        <p:spPr>
+          <a:xfrm>
+            <a:off x="3750235" y="4335930"/>
+            <a:ext cx="1075765" cy="1045883"/>
+          </a:xfrm>
+          <a:prstGeom prst="rect">
+            <a:avLst/>
+          </a:prstGeom>
+          <a:noFill/>
+          <a:ln>
+            <a:solidFill>
+              <a:schemeClr val="tx1"/>
+            </a:solidFill>
+          </a:ln>
+        </p:spPr>
+        <p:style>
+          <a:lnRef idx="1">
+            <a:schemeClr val="accent1"/>
+          </a:lnRef>
+          <a:fillRef idx="3">
+            <a:schemeClr val="accent1"/>
+          </a:fillRef>
+          <a:effectRef idx="2">
+            <a:schemeClr val="accent1"/>
+          </a:effectRef>
+          <a:fontRef idx="minor">
+            <a:schemeClr val="lt1"/>
+          </a:fontRef>
+        </p:style>
+        <p:txBody>
+          <a:bodyPr rtlCol="0" anchor="ctr"/>
+          <a:lstStyle/>
+          <a:p>
+            <a:pPr algn="ctr"/>
+            <a:endParaRPr lang="en-US"/>
+          </a:p>
+        </p:txBody>
+      </p:sp>
+      <p:sp>
+        <p:nvSpPr>
+          <p:cNvPr id="2" name="TextBox 1"/>
+          <p:cNvSpPr txBox="1"/>
+          <p:nvPr/>
+        </p:nvSpPr>
+        <p:spPr>
+          <a:xfrm>
+            <a:off x="3841715" y="4572000"/>
+            <a:ext cx="941283" cy="369332"/>
+          </a:xfrm>
+          <a:prstGeom prst="rect">
+            <a:avLst/>
+          </a:prstGeom>
+          <a:noFill/>
+        </p:spPr>
+        <p:txBody>
+          <a:bodyPr wrap="none" rtlCol="0">
+            <a:spAutoFit/>
+          </a:bodyPr>
+          <a:lstStyle/>
+          <a:p>
+            <a:r>
+              <a:rPr lang="en-US" dirty="0" smtClean="0"/>
+              <a:t>Security</a:t>
             </a:r>
             <a:endParaRPr lang="en-US" dirty="0"/>
           </a:p>
@@ -4242,15 +4316,7 @@
             <a:pPr algn="ctr"/>
             <a:r>
               <a:rPr lang="en-US" dirty="0" smtClean="0"/>
-              <a:t>4: </a:t>
-            </a:r>
-            <a:r>
-              <a:rPr lang="en-US" dirty="0" smtClean="0"/>
-              <a:t>Infirmary</a:t>
-            </a:r>
-            <a:r>
-              <a:rPr lang="en-US" dirty="0" smtClean="0"/>
-              <a:t>: Pink</a:t>
+              <a:t>4: Infirmary: Pink</a:t>
             </a:r>
             <a:endParaRPr lang="en-US" dirty="0"/>
           </a:p>
@@ -8270,24 +8336,25 @@
         </p:nvSpPr>
         <p:spPr>
           <a:xfrm>
-            <a:off x="5132773" y="4187109"/>
-            <a:ext cx="662361" cy="253916"/>
-          </a:xfrm>
-          <a:prstGeom prst="rect">
-            <a:avLst/>
-          </a:prstGeom>
-          <a:noFill/>
-        </p:spPr>
-        <p:txBody>
-          <a:bodyPr wrap="none" rtlCol="0">
-            <a:spAutoFit/>
-          </a:bodyPr>
-          <a:lstStyle/>
-          <a:p>
-            <a:r>
-              <a:rPr lang="en-US" sz="1050" dirty="0"/>
-              <a:t>Walmart</a:t>
-            </a:r>
+            <a:off x="5162917" y="4187109"/>
+            <a:ext cx="634383" cy="253916"/>
+          </a:xfrm>
+          <a:prstGeom prst="rect">
+            <a:avLst/>
+          </a:prstGeom>
+          <a:noFill/>
+        </p:spPr>
+        <p:txBody>
+          <a:bodyPr wrap="none" rtlCol="0">
+            <a:spAutoFit/>
+          </a:bodyPr>
+          <a:lstStyle/>
+          <a:p>
+            <a:r>
+              <a:rPr lang="en-US" sz="1050" smtClean="0"/>
+              <a:t>Hospital</a:t>
+            </a:r>
+            <a:endParaRPr lang="en-US" sz="1050" dirty="0"/>
           </a:p>
         </p:txBody>
       </p:sp>

</xml_diff>